<commit_message>
actualizacion de lo avanzado
</commit_message>
<xml_diff>
--- a/ingelearn/curso ingelearn.PPTX
+++ b/ingelearn/curso ingelearn.PPTX
@@ -5,7 +5,7 @@
     <p:sldMasterId id="2147483660" r:id="rId1"/>
   </p:sldMasterIdLst>
   <p:notesMasterIdLst>
-    <p:notesMasterId r:id="rId17"/>
+    <p:notesMasterId r:id="rId28"/>
   </p:notesMasterIdLst>
   <p:sldIdLst>
     <p:sldId id="256" r:id="rId2"/>
@@ -23,6 +23,17 @@
     <p:sldId id="268" r:id="rId14"/>
     <p:sldId id="269" r:id="rId15"/>
     <p:sldId id="270" r:id="rId16"/>
+    <p:sldId id="271" r:id="rId17"/>
+    <p:sldId id="272" r:id="rId18"/>
+    <p:sldId id="273" r:id="rId19"/>
+    <p:sldId id="274" r:id="rId20"/>
+    <p:sldId id="275" r:id="rId21"/>
+    <p:sldId id="276" r:id="rId22"/>
+    <p:sldId id="277" r:id="rId23"/>
+    <p:sldId id="278" r:id="rId24"/>
+    <p:sldId id="280" r:id="rId25"/>
+    <p:sldId id="279" r:id="rId26"/>
+    <p:sldId id="281" r:id="rId27"/>
   </p:sldIdLst>
   <p:sldSz cx="12192000" cy="6858000"/>
   <p:notesSz cx="6858000" cy="9144000"/>
@@ -121,6 +132,11 @@
       </a:defRPr>
     </a:lvl9pPr>
   </p:defaultTextStyle>
+  <p:extLst>
+    <p:ext uri="{EFAFB233-063F-42B5-8137-9DF3F51BA10A}">
+      <p15:sldGuideLst xmlns:p15="http://schemas.microsoft.com/office/powerpoint/2012/main"/>
+    </p:ext>
+  </p:extLst>
 </p:presentation>
 </file>
 
@@ -206,7 +222,7 @@
           <a:p>
             <a:fld id="{68994814-A4AA-45FF-9516-BFD3F33B7A58}" type="datetimeFigureOut">
               <a:rPr lang="en-US" smtClean="0"/>
-              <a:t>11/14/2024</a:t>
+              <a:t>11/17/2024</a:t>
             </a:fld>
             <a:endParaRPr lang="en-US"/>
           </a:p>
@@ -1769,7 +1785,7 @@
           <a:p>
             <a:fld id="{5B1DC8A6-9A52-435A-85FD-9248DA6D9E8A}" type="datetimeFigureOut">
               <a:rPr lang="en-US" smtClean="0"/>
-              <a:t>11/14/2024</a:t>
+              <a:t>11/17/2024</a:t>
             </a:fld>
             <a:endParaRPr lang="en-US"/>
           </a:p>
@@ -2007,7 +2023,7 @@
           <a:p>
             <a:fld id="{5B1DC8A6-9A52-435A-85FD-9248DA6D9E8A}" type="datetimeFigureOut">
               <a:rPr lang="en-US" smtClean="0"/>
-              <a:t>11/14/2024</a:t>
+              <a:t>11/17/2024</a:t>
             </a:fld>
             <a:endParaRPr lang="en-US"/>
           </a:p>
@@ -2187,7 +2203,7 @@
           <a:p>
             <a:fld id="{5B1DC8A6-9A52-435A-85FD-9248DA6D9E8A}" type="datetimeFigureOut">
               <a:rPr lang="en-US" smtClean="0"/>
-              <a:t>11/14/2024</a:t>
+              <a:t>11/17/2024</a:t>
             </a:fld>
             <a:endParaRPr lang="en-US"/>
           </a:p>
@@ -2357,7 +2373,7 @@
           <a:p>
             <a:fld id="{5B1DC8A6-9A52-435A-85FD-9248DA6D9E8A}" type="datetimeFigureOut">
               <a:rPr lang="en-US" smtClean="0"/>
-              <a:t>11/14/2024</a:t>
+              <a:t>11/17/2024</a:t>
             </a:fld>
             <a:endParaRPr lang="en-US"/>
           </a:p>
@@ -2633,7 +2649,7 @@
           <a:p>
             <a:fld id="{5B1DC8A6-9A52-435A-85FD-9248DA6D9E8A}" type="datetimeFigureOut">
               <a:rPr lang="en-US" smtClean="0"/>
-              <a:t>11/14/2024</a:t>
+              <a:t>11/17/2024</a:t>
             </a:fld>
             <a:endParaRPr lang="en-US"/>
           </a:p>
@@ -3834,7 +3850,7 @@
           <a:p>
             <a:fld id="{5B1DC8A6-9A52-435A-85FD-9248DA6D9E8A}" type="datetimeFigureOut">
               <a:rPr lang="en-US" smtClean="0"/>
-              <a:t>11/14/2024</a:t>
+              <a:t>11/17/2024</a:t>
             </a:fld>
             <a:endParaRPr lang="en-US"/>
           </a:p>
@@ -4224,7 +4240,7 @@
           <a:p>
             <a:fld id="{5B1DC8A6-9A52-435A-85FD-9248DA6D9E8A}" type="datetimeFigureOut">
               <a:rPr lang="en-US" smtClean="0"/>
-              <a:t>11/14/2024</a:t>
+              <a:t>11/17/2024</a:t>
             </a:fld>
             <a:endParaRPr lang="en-US"/>
           </a:p>
@@ -4347,7 +4363,7 @@
           <a:p>
             <a:fld id="{5B1DC8A6-9A52-435A-85FD-9248DA6D9E8A}" type="datetimeFigureOut">
               <a:rPr lang="en-US" smtClean="0"/>
-              <a:t>11/14/2024</a:t>
+              <a:t>11/17/2024</a:t>
             </a:fld>
             <a:endParaRPr lang="en-US"/>
           </a:p>
@@ -4442,7 +4458,7 @@
           <a:p>
             <a:fld id="{5B1DC8A6-9A52-435A-85FD-9248DA6D9E8A}" type="datetimeFigureOut">
               <a:rPr lang="en-US" smtClean="0"/>
-              <a:t>11/14/2024</a:t>
+              <a:t>11/17/2024</a:t>
             </a:fld>
             <a:endParaRPr lang="en-US"/>
           </a:p>
@@ -5205,7 +5221,7 @@
           <a:p>
             <a:fld id="{5B1DC8A6-9A52-435A-85FD-9248DA6D9E8A}" type="datetimeFigureOut">
               <a:rPr lang="en-US" smtClean="0"/>
-              <a:t>11/14/2024</a:t>
+              <a:t>11/17/2024</a:t>
             </a:fld>
             <a:endParaRPr lang="en-US"/>
           </a:p>
@@ -6045,7 +6061,7 @@
           <a:p>
             <a:fld id="{5B1DC8A6-9A52-435A-85FD-9248DA6D9E8A}" type="datetimeFigureOut">
               <a:rPr lang="en-US" smtClean="0"/>
-              <a:t>11/14/2024</a:t>
+              <a:t>11/17/2024</a:t>
             </a:fld>
             <a:endParaRPr lang="en-US"/>
           </a:p>
@@ -6272,7 +6288,7 @@
           <a:p>
             <a:fld id="{5B1DC8A6-9A52-435A-85FD-9248DA6D9E8A}" type="datetimeFigureOut">
               <a:rPr lang="en-US" smtClean="0"/>
-              <a:t>11/14/2024</a:t>
+              <a:t>11/17/2024</a:t>
             </a:fld>
             <a:endParaRPr lang="en-US"/>
           </a:p>
@@ -8000,6 +8016,826 @@
 </p:sld>
 </file>
 
+<file path=ppt/slides/slide16.xml><?xml version="1.0" encoding="utf-8"?>
+<p:sld xmlns:a="http://schemas.openxmlformats.org/drawingml/2006/main" xmlns:r="http://schemas.openxmlformats.org/officeDocument/2006/relationships" xmlns:p="http://schemas.openxmlformats.org/presentationml/2006/main">
+  <p:cSld>
+    <p:spTree>
+      <p:nvGrpSpPr>
+        <p:cNvPr id="1" name=""/>
+        <p:cNvGrpSpPr/>
+        <p:nvPr/>
+      </p:nvGrpSpPr>
+      <p:grpSpPr>
+        <a:xfrm>
+          <a:off x="0" y="0"/>
+          <a:ext cx="0" cy="0"/>
+          <a:chOff x="0" y="0"/>
+          <a:chExt cx="0" cy="0"/>
+        </a:xfrm>
+      </p:grpSpPr>
+      <p:sp>
+        <p:nvSpPr>
+          <p:cNvPr id="2" name="Título 1"/>
+          <p:cNvSpPr>
+            <a:spLocks noGrp="1"/>
+          </p:cNvSpPr>
+          <p:nvPr>
+            <p:ph type="title"/>
+          </p:nvPr>
+        </p:nvSpPr>
+        <p:spPr/>
+        <p:txBody>
+          <a:bodyPr/>
+          <a:lstStyle/>
+          <a:p>
+            <a:r>
+              <a:rPr lang="es-BO" dirty="0" smtClean="0"/>
+              <a:t>INTRODUCCION A LOS EQUIPOS INDUSDRIALES</a:t>
+            </a:r>
+            <a:endParaRPr lang="en-US" dirty="0"/>
+          </a:p>
+        </p:txBody>
+      </p:sp>
+      <p:sp>
+        <p:nvSpPr>
+          <p:cNvPr id="3" name="Marcador de contenido 2"/>
+          <p:cNvSpPr>
+            <a:spLocks noGrp="1"/>
+          </p:cNvSpPr>
+          <p:nvPr>
+            <p:ph idx="1"/>
+          </p:nvPr>
+        </p:nvSpPr>
+        <p:spPr/>
+        <p:txBody>
+          <a:bodyPr/>
+          <a:lstStyle/>
+          <a:p>
+            <a:r>
+              <a:rPr lang="es-BO" dirty="0" smtClean="0"/>
+              <a:t>PLC (CONTROLADOR LOGICO PROGRAMABLE) es un dispositivo que se puede programar y  que realiza de manera automática las tareas que nosotros le designemos, un </a:t>
+            </a:r>
+            <a:r>
+              <a:rPr lang="es-BO" dirty="0" err="1" smtClean="0"/>
+              <a:t>plc</a:t>
+            </a:r>
+            <a:r>
+              <a:rPr lang="es-BO" dirty="0" smtClean="0"/>
+              <a:t> esta diseñado para trabajar en entornos industriales con lo cual es robusto, </a:t>
+            </a:r>
+            <a:r>
+              <a:rPr lang="es-BO" dirty="0" err="1" smtClean="0"/>
+              <a:t>resitente</a:t>
+            </a:r>
+            <a:r>
+              <a:rPr lang="es-BO" dirty="0" smtClean="0"/>
+              <a:t> y esta fabricado para durar muchísimos años, hoy en </a:t>
+            </a:r>
+            <a:r>
+              <a:rPr lang="es-BO" dirty="0" err="1" smtClean="0"/>
+              <a:t>dia</a:t>
+            </a:r>
+            <a:r>
+              <a:rPr lang="es-BO" dirty="0" smtClean="0"/>
+              <a:t> se puede usar para:</a:t>
+            </a:r>
+          </a:p>
+          <a:p>
+            <a:pPr algn="ctr"/>
+            <a:r>
+              <a:rPr lang="es-BO" dirty="0" smtClean="0"/>
+              <a:t>Cintas transportadoras</a:t>
+            </a:r>
+          </a:p>
+          <a:p>
+            <a:pPr algn="ctr"/>
+            <a:r>
+              <a:rPr lang="es-BO" dirty="0" smtClean="0"/>
+              <a:t>Maquinas potabilizadoras</a:t>
+            </a:r>
+          </a:p>
+          <a:p>
+            <a:pPr algn="ctr"/>
+            <a:r>
+              <a:rPr lang="es-BO" dirty="0" smtClean="0"/>
+              <a:t>Centros de distribución</a:t>
+            </a:r>
+          </a:p>
+          <a:p>
+            <a:pPr algn="ctr"/>
+            <a:r>
+              <a:rPr lang="es-BO" dirty="0" smtClean="0"/>
+              <a:t>Etc.</a:t>
+            </a:r>
+            <a:endParaRPr lang="en-US" dirty="0" smtClean="0"/>
+          </a:p>
+          <a:p>
+            <a:pPr algn="just"/>
+            <a:r>
+              <a:rPr lang="es-BO" dirty="0" smtClean="0"/>
+              <a:t>Según la norma IEC 61131 esta norma determina 5 lenguajes de programación.</a:t>
+            </a:r>
+          </a:p>
+        </p:txBody>
+      </p:sp>
+    </p:spTree>
+    <p:extLst>
+      <p:ext uri="{BB962C8B-B14F-4D97-AF65-F5344CB8AC3E}">
+        <p14:creationId xmlns:p14="http://schemas.microsoft.com/office/powerpoint/2010/main" val="1374633923"/>
+      </p:ext>
+    </p:extLst>
+  </p:cSld>
+  <p:clrMapOvr>
+    <a:masterClrMapping/>
+  </p:clrMapOvr>
+</p:sld>
+</file>
+
+<file path=ppt/slides/slide17.xml><?xml version="1.0" encoding="utf-8"?>
+<p:sld xmlns:a="http://schemas.openxmlformats.org/drawingml/2006/main" xmlns:r="http://schemas.openxmlformats.org/officeDocument/2006/relationships" xmlns:p="http://schemas.openxmlformats.org/presentationml/2006/main">
+  <p:cSld>
+    <p:spTree>
+      <p:nvGrpSpPr>
+        <p:cNvPr id="1" name=""/>
+        <p:cNvGrpSpPr/>
+        <p:nvPr/>
+      </p:nvGrpSpPr>
+      <p:grpSpPr>
+        <a:xfrm>
+          <a:off x="0" y="0"/>
+          <a:ext cx="0" cy="0"/>
+          <a:chOff x="0" y="0"/>
+          <a:chExt cx="0" cy="0"/>
+        </a:xfrm>
+      </p:grpSpPr>
+      <p:sp>
+        <p:nvSpPr>
+          <p:cNvPr id="3" name="Marcador de contenido 2"/>
+          <p:cNvSpPr>
+            <a:spLocks noGrp="1"/>
+          </p:cNvSpPr>
+          <p:nvPr>
+            <p:ph idx="1"/>
+          </p:nvPr>
+        </p:nvSpPr>
+        <p:spPr>
+          <a:xfrm>
+            <a:off x="1251678" y="206189"/>
+            <a:ext cx="10178322" cy="6257364"/>
+          </a:xfrm>
+        </p:spPr>
+        <p:txBody>
+          <a:bodyPr/>
+          <a:lstStyle/>
+          <a:p>
+            <a:pPr algn="just"/>
+            <a:r>
+              <a:rPr lang="es-BO" dirty="0" smtClean="0"/>
+              <a:t>La diferencia entre un PLC y un ARDUINO esta en la </a:t>
+            </a:r>
+            <a:r>
+              <a:rPr lang="es-BO" dirty="0" err="1" smtClean="0"/>
+              <a:t>robustes</a:t>
+            </a:r>
+            <a:r>
+              <a:rPr lang="es-BO" dirty="0" smtClean="0"/>
+              <a:t> los PLC están fabricados específicamente para trabajar en entornos industriales, esto quiere decir que soportan temperaturas extremas están fabricados con componentes que pueden duran muchos años y fundamentalmente emisiones </a:t>
+            </a:r>
+            <a:r>
+              <a:rPr lang="es-BO" dirty="0" err="1" smtClean="0"/>
+              <a:t>electromacneticas</a:t>
+            </a:r>
+            <a:r>
+              <a:rPr lang="es-BO" dirty="0" smtClean="0"/>
+              <a:t> que pueden recibir de cualquier dispositivo industrial</a:t>
+            </a:r>
+          </a:p>
+          <a:p>
+            <a:pPr algn="just"/>
+            <a:r>
+              <a:rPr lang="es-BO" dirty="0" smtClean="0"/>
+              <a:t>Un </a:t>
+            </a:r>
+            <a:r>
+              <a:rPr lang="es-BO" dirty="0" err="1" smtClean="0"/>
+              <a:t>arduino</a:t>
+            </a:r>
+            <a:r>
+              <a:rPr lang="es-BO" dirty="0" smtClean="0"/>
+              <a:t> es fácil de programar, fácil de conseguir y mucho mas sensibles</a:t>
+            </a:r>
+          </a:p>
+          <a:p>
+            <a:pPr algn="just"/>
+            <a:r>
+              <a:rPr lang="es-BO" dirty="0" smtClean="0"/>
+              <a:t>Un HDM (Interfaz humanos maquina) este es un panel de operador que se utiliza para mostrar información de un proceso, estos nos permiten controlar y parametrizar cualquier maquina o cualquier sistema que pueda llegar a tener dentro de la industria </a:t>
+            </a:r>
+          </a:p>
+          <a:p>
+            <a:pPr algn="just"/>
+            <a:r>
+              <a:rPr lang="es-BO" dirty="0" smtClean="0"/>
+              <a:t>Sensores, es cualquier cosa que nosotros conectamos a un PLC o a cualquier otro sistema industrial y relevan información física de nuestro entorno, pueden relevar presiones, caudales, temperaturas o cualquier otra magnitud que nos podamos encontrar en una industria se utiliza para monitorear los sistemas y controlar cada uno de los aspectos de este ya sea de cuantos paquetes nos vamos a encontrar en una cinta transportadora, cuantos gramos de material debo pesar, cuanto liquido debo hacer pasar por un tubo.</a:t>
+            </a:r>
+            <a:endParaRPr lang="en-US" dirty="0"/>
+          </a:p>
+        </p:txBody>
+      </p:sp>
+    </p:spTree>
+    <p:extLst>
+      <p:ext uri="{BB962C8B-B14F-4D97-AF65-F5344CB8AC3E}">
+        <p14:creationId xmlns:p14="http://schemas.microsoft.com/office/powerpoint/2010/main" val="1871649356"/>
+      </p:ext>
+    </p:extLst>
+  </p:cSld>
+  <p:clrMapOvr>
+    <a:masterClrMapping/>
+  </p:clrMapOvr>
+</p:sld>
+</file>
+
+<file path=ppt/slides/slide18.xml><?xml version="1.0" encoding="utf-8"?>
+<p:sld xmlns:a="http://schemas.openxmlformats.org/drawingml/2006/main" xmlns:r="http://schemas.openxmlformats.org/officeDocument/2006/relationships" xmlns:p="http://schemas.openxmlformats.org/presentationml/2006/main">
+  <p:cSld>
+    <p:spTree>
+      <p:nvGrpSpPr>
+        <p:cNvPr id="1" name=""/>
+        <p:cNvGrpSpPr/>
+        <p:nvPr/>
+      </p:nvGrpSpPr>
+      <p:grpSpPr>
+        <a:xfrm>
+          <a:off x="0" y="0"/>
+          <a:ext cx="0" cy="0"/>
+          <a:chOff x="0" y="0"/>
+          <a:chExt cx="0" cy="0"/>
+        </a:xfrm>
+      </p:grpSpPr>
+      <p:sp>
+        <p:nvSpPr>
+          <p:cNvPr id="3" name="Marcador de contenido 2"/>
+          <p:cNvSpPr>
+            <a:spLocks noGrp="1"/>
+          </p:cNvSpPr>
+          <p:nvPr>
+            <p:ph idx="1"/>
+          </p:nvPr>
+        </p:nvSpPr>
+        <p:spPr>
+          <a:xfrm>
+            <a:off x="1251678" y="215153"/>
+            <a:ext cx="10178322" cy="6293223"/>
+          </a:xfrm>
+        </p:spPr>
+        <p:txBody>
+          <a:bodyPr/>
+          <a:lstStyle/>
+          <a:p>
+            <a:r>
+              <a:rPr lang="es-BO" dirty="0" smtClean="0"/>
+              <a:t>Los actuadores son aquellos sistemas que están conectados que nos permiten ejercer alguna acción sobre alguna magnitud física es decir que vamos a tener motores que activan y desactivan las cintas, luces que nos permiten hacer indicaciones sobre el estado del sistema, vamos a tener pistones, válvulas, vamos a tener cualquier equipo que nos permitan controlar el proceso de forma directa, trabajan en conjunto con los sensores y el PLC es quien toma las decisiones y les dice a los actuadores cuando </a:t>
+            </a:r>
+            <a:r>
+              <a:rPr lang="es-BO" dirty="0" err="1" smtClean="0"/>
+              <a:t>cuando</a:t>
+            </a:r>
+            <a:r>
+              <a:rPr lang="es-BO" dirty="0" smtClean="0"/>
+              <a:t> se deben prender, apagar, abrir, cerrar, dependiendo del actuadores que sea.</a:t>
+            </a:r>
+          </a:p>
+          <a:p>
+            <a:r>
+              <a:rPr lang="es-BO" dirty="0" smtClean="0"/>
+              <a:t>Las comunicaciones, </a:t>
+            </a:r>
+            <a:r>
+              <a:rPr lang="es-BO" dirty="0" err="1" smtClean="0"/>
+              <a:t>Switches</a:t>
+            </a:r>
+            <a:r>
+              <a:rPr lang="es-BO" dirty="0" smtClean="0"/>
+              <a:t>, </a:t>
+            </a:r>
+            <a:r>
+              <a:rPr lang="es-BO" dirty="0" err="1" smtClean="0"/>
+              <a:t>gatways</a:t>
+            </a:r>
+            <a:r>
+              <a:rPr lang="es-BO" dirty="0"/>
+              <a:t> </a:t>
+            </a:r>
+            <a:r>
+              <a:rPr lang="es-BO" dirty="0" smtClean="0"/>
+              <a:t>que nos sirven para conectar y compartir información en grandes cantidades </a:t>
+            </a:r>
+          </a:p>
+          <a:p>
+            <a:r>
+              <a:rPr lang="es-BO" dirty="0" smtClean="0"/>
+              <a:t>Los SCADA/DCS se utiliza para </a:t>
+            </a:r>
+            <a:r>
+              <a:rPr lang="es-BO" dirty="0" err="1" smtClean="0"/>
+              <a:t>motiroar</a:t>
+            </a:r>
+            <a:r>
+              <a:rPr lang="es-BO" dirty="0" smtClean="0"/>
+              <a:t> sistemas completos o monitorear una planta entera la diferencia entre los dos radica entre como operan, los SCADA, son sistemas de adquisición y </a:t>
+            </a:r>
+            <a:r>
+              <a:rPr lang="es-BO" dirty="0" err="1" smtClean="0"/>
+              <a:t>supervicion</a:t>
+            </a:r>
+            <a:r>
+              <a:rPr lang="es-BO" dirty="0" smtClean="0"/>
+              <a:t>. Y DCS es mas de control.</a:t>
+            </a:r>
+          </a:p>
+          <a:p>
+            <a:r>
+              <a:rPr lang="es-BO" dirty="0" smtClean="0"/>
+              <a:t>Todo esto compone un SISTEMA INDUSTRIAL TIPICO</a:t>
+            </a:r>
+            <a:endParaRPr lang="en-US" dirty="0"/>
+          </a:p>
+        </p:txBody>
+      </p:sp>
+    </p:spTree>
+    <p:extLst>
+      <p:ext uri="{BB962C8B-B14F-4D97-AF65-F5344CB8AC3E}">
+        <p14:creationId xmlns:p14="http://schemas.microsoft.com/office/powerpoint/2010/main" val="3493347446"/>
+      </p:ext>
+    </p:extLst>
+  </p:cSld>
+  <p:clrMapOvr>
+    <a:masterClrMapping/>
+  </p:clrMapOvr>
+</p:sld>
+</file>
+
+<file path=ppt/slides/slide19.xml><?xml version="1.0" encoding="utf-8"?>
+<p:sld xmlns:a="http://schemas.openxmlformats.org/drawingml/2006/main" xmlns:r="http://schemas.openxmlformats.org/officeDocument/2006/relationships" xmlns:p="http://schemas.openxmlformats.org/presentationml/2006/main">
+  <p:cSld>
+    <p:spTree>
+      <p:nvGrpSpPr>
+        <p:cNvPr id="1" name=""/>
+        <p:cNvGrpSpPr/>
+        <p:nvPr/>
+      </p:nvGrpSpPr>
+      <p:grpSpPr>
+        <a:xfrm>
+          <a:off x="0" y="0"/>
+          <a:ext cx="0" cy="0"/>
+          <a:chOff x="0" y="0"/>
+          <a:chExt cx="0" cy="0"/>
+        </a:xfrm>
+      </p:grpSpPr>
+      <p:sp>
+        <p:nvSpPr>
+          <p:cNvPr id="2" name="Título 1"/>
+          <p:cNvSpPr>
+            <a:spLocks noGrp="1"/>
+          </p:cNvSpPr>
+          <p:nvPr>
+            <p:ph type="title"/>
+          </p:nvPr>
+        </p:nvSpPr>
+        <p:spPr/>
+        <p:txBody>
+          <a:bodyPr/>
+          <a:lstStyle/>
+          <a:p>
+            <a:r>
+              <a:rPr lang="es-BO" dirty="0" smtClean="0"/>
+              <a:t>SISTEMA INDUSTRIAL TIPICO</a:t>
+            </a:r>
+            <a:endParaRPr lang="en-US" dirty="0"/>
+          </a:p>
+        </p:txBody>
+      </p:sp>
+      <p:pic>
+        <p:nvPicPr>
+          <p:cNvPr id="4" name="Imagen 3"/>
+          <p:cNvPicPr>
+            <a:picLocks noChangeAspect="1"/>
+          </p:cNvPicPr>
+          <p:nvPr/>
+        </p:nvPicPr>
+        <p:blipFill>
+          <a:blip r:embed="rId2"/>
+          <a:stretch>
+            <a:fillRect/>
+          </a:stretch>
+        </p:blipFill>
+        <p:spPr>
+          <a:xfrm>
+            <a:off x="1025874" y="1716963"/>
+            <a:ext cx="8383170" cy="4858428"/>
+          </a:xfrm>
+          <a:prstGeom prst="rect">
+            <a:avLst/>
+          </a:prstGeom>
+        </p:spPr>
+      </p:pic>
+      <p:cxnSp>
+        <p:nvCxnSpPr>
+          <p:cNvPr id="6" name="Conector recto de flecha 5"/>
+          <p:cNvCxnSpPr/>
+          <p:nvPr/>
+        </p:nvCxnSpPr>
+        <p:spPr>
+          <a:xfrm flipV="1">
+            <a:off x="5531224" y="1990165"/>
+            <a:ext cx="4276164" cy="779929"/>
+          </a:xfrm>
+          <a:prstGeom prst="straightConnector1">
+            <a:avLst/>
+          </a:prstGeom>
+          <a:ln w="19050">
+            <a:tailEnd type="triangle"/>
+          </a:ln>
+        </p:spPr>
+        <p:style>
+          <a:lnRef idx="1">
+            <a:schemeClr val="accent1"/>
+          </a:lnRef>
+          <a:fillRef idx="0">
+            <a:schemeClr val="accent1"/>
+          </a:fillRef>
+          <a:effectRef idx="0">
+            <a:schemeClr val="accent1"/>
+          </a:effectRef>
+          <a:fontRef idx="minor">
+            <a:schemeClr val="tx1"/>
+          </a:fontRef>
+        </p:style>
+      </p:cxnSp>
+      <p:cxnSp>
+        <p:nvCxnSpPr>
+          <p:cNvPr id="7" name="Conector recto de flecha 6"/>
+          <p:cNvCxnSpPr/>
+          <p:nvPr/>
+        </p:nvCxnSpPr>
+        <p:spPr>
+          <a:xfrm flipV="1">
+            <a:off x="6705601" y="2770094"/>
+            <a:ext cx="3003175" cy="617108"/>
+          </a:xfrm>
+          <a:prstGeom prst="straightConnector1">
+            <a:avLst/>
+          </a:prstGeom>
+          <a:ln w="19050">
+            <a:tailEnd type="triangle"/>
+          </a:ln>
+        </p:spPr>
+        <p:style>
+          <a:lnRef idx="1">
+            <a:schemeClr val="accent1"/>
+          </a:lnRef>
+          <a:fillRef idx="0">
+            <a:schemeClr val="accent1"/>
+          </a:fillRef>
+          <a:effectRef idx="0">
+            <a:schemeClr val="accent1"/>
+          </a:effectRef>
+          <a:fontRef idx="minor">
+            <a:schemeClr val="tx1"/>
+          </a:fontRef>
+        </p:style>
+      </p:cxnSp>
+      <p:cxnSp>
+        <p:nvCxnSpPr>
+          <p:cNvPr id="9" name="Conector recto de flecha 8"/>
+          <p:cNvCxnSpPr/>
+          <p:nvPr/>
+        </p:nvCxnSpPr>
+        <p:spPr>
+          <a:xfrm flipV="1">
+            <a:off x="8041342" y="3660989"/>
+            <a:ext cx="1595717" cy="211036"/>
+          </a:xfrm>
+          <a:prstGeom prst="straightConnector1">
+            <a:avLst/>
+          </a:prstGeom>
+          <a:ln w="19050">
+            <a:tailEnd type="triangle"/>
+          </a:ln>
+        </p:spPr>
+        <p:style>
+          <a:lnRef idx="1">
+            <a:schemeClr val="accent1"/>
+          </a:lnRef>
+          <a:fillRef idx="0">
+            <a:schemeClr val="accent1"/>
+          </a:fillRef>
+          <a:effectRef idx="0">
+            <a:schemeClr val="accent1"/>
+          </a:effectRef>
+          <a:fontRef idx="minor">
+            <a:schemeClr val="tx1"/>
+          </a:fontRef>
+        </p:style>
+      </p:cxnSp>
+      <p:cxnSp>
+        <p:nvCxnSpPr>
+          <p:cNvPr id="11" name="Conector recto de flecha 10"/>
+          <p:cNvCxnSpPr/>
+          <p:nvPr/>
+        </p:nvCxnSpPr>
+        <p:spPr>
+          <a:xfrm flipV="1">
+            <a:off x="6651812" y="4104672"/>
+            <a:ext cx="2985247" cy="314929"/>
+          </a:xfrm>
+          <a:prstGeom prst="straightConnector1">
+            <a:avLst/>
+          </a:prstGeom>
+          <a:ln w="19050">
+            <a:tailEnd type="triangle"/>
+          </a:ln>
+        </p:spPr>
+        <p:style>
+          <a:lnRef idx="1">
+            <a:schemeClr val="accent1"/>
+          </a:lnRef>
+          <a:fillRef idx="0">
+            <a:schemeClr val="accent1"/>
+          </a:fillRef>
+          <a:effectRef idx="0">
+            <a:schemeClr val="accent1"/>
+          </a:effectRef>
+          <a:fontRef idx="minor">
+            <a:schemeClr val="tx1"/>
+          </a:fontRef>
+        </p:style>
+      </p:cxnSp>
+      <p:cxnSp>
+        <p:nvCxnSpPr>
+          <p:cNvPr id="14" name="Conector recto de flecha 13"/>
+          <p:cNvCxnSpPr/>
+          <p:nvPr/>
+        </p:nvCxnSpPr>
+        <p:spPr>
+          <a:xfrm flipV="1">
+            <a:off x="5351929" y="4881452"/>
+            <a:ext cx="4455459" cy="45645"/>
+          </a:xfrm>
+          <a:prstGeom prst="straightConnector1">
+            <a:avLst/>
+          </a:prstGeom>
+          <a:ln w="19050">
+            <a:tailEnd type="triangle"/>
+          </a:ln>
+        </p:spPr>
+        <p:style>
+          <a:lnRef idx="1">
+            <a:schemeClr val="accent1"/>
+          </a:lnRef>
+          <a:fillRef idx="0">
+            <a:schemeClr val="accent1"/>
+          </a:fillRef>
+          <a:effectRef idx="0">
+            <a:schemeClr val="accent1"/>
+          </a:effectRef>
+          <a:fontRef idx="minor">
+            <a:schemeClr val="tx1"/>
+          </a:fontRef>
+        </p:style>
+      </p:cxnSp>
+      <p:cxnSp>
+        <p:nvCxnSpPr>
+          <p:cNvPr id="16" name="Conector recto de flecha 15"/>
+          <p:cNvCxnSpPr/>
+          <p:nvPr/>
+        </p:nvCxnSpPr>
+        <p:spPr>
+          <a:xfrm flipV="1">
+            <a:off x="7915836" y="5754179"/>
+            <a:ext cx="1792940" cy="64814"/>
+          </a:xfrm>
+          <a:prstGeom prst="straightConnector1">
+            <a:avLst/>
+          </a:prstGeom>
+          <a:ln w="19050">
+            <a:tailEnd type="triangle"/>
+          </a:ln>
+        </p:spPr>
+        <p:style>
+          <a:lnRef idx="1">
+            <a:schemeClr val="accent1"/>
+          </a:lnRef>
+          <a:fillRef idx="0">
+            <a:schemeClr val="accent1"/>
+          </a:fillRef>
+          <a:effectRef idx="0">
+            <a:schemeClr val="accent1"/>
+          </a:effectRef>
+          <a:fontRef idx="minor">
+            <a:schemeClr val="tx1"/>
+          </a:fontRef>
+        </p:style>
+      </p:cxnSp>
+      <p:sp>
+        <p:nvSpPr>
+          <p:cNvPr id="18" name="CuadroTexto 17"/>
+          <p:cNvSpPr txBox="1"/>
+          <p:nvPr/>
+        </p:nvSpPr>
+        <p:spPr>
+          <a:xfrm>
+            <a:off x="9807388" y="1783534"/>
+            <a:ext cx="1242648" cy="369332"/>
+          </a:xfrm>
+          <a:prstGeom prst="rect">
+            <a:avLst/>
+          </a:prstGeom>
+          <a:noFill/>
+        </p:spPr>
+        <p:txBody>
+          <a:bodyPr wrap="none" rtlCol="0">
+            <a:spAutoFit/>
+          </a:bodyPr>
+          <a:lstStyle/>
+          <a:p>
+            <a:r>
+              <a:rPr lang="es-BO" dirty="0" smtClean="0"/>
+              <a:t>SENSORES</a:t>
+            </a:r>
+            <a:endParaRPr lang="en-US" dirty="0"/>
+          </a:p>
+        </p:txBody>
+      </p:sp>
+      <p:sp>
+        <p:nvSpPr>
+          <p:cNvPr id="19" name="CuadroTexto 18"/>
+          <p:cNvSpPr txBox="1"/>
+          <p:nvPr/>
+        </p:nvSpPr>
+        <p:spPr>
+          <a:xfrm>
+            <a:off x="9708776" y="2560864"/>
+            <a:ext cx="579005" cy="369332"/>
+          </a:xfrm>
+          <a:prstGeom prst="rect">
+            <a:avLst/>
+          </a:prstGeom>
+          <a:noFill/>
+        </p:spPr>
+        <p:txBody>
+          <a:bodyPr wrap="none" rtlCol="0">
+            <a:spAutoFit/>
+          </a:bodyPr>
+          <a:lstStyle/>
+          <a:p>
+            <a:r>
+              <a:rPr lang="es-BO" dirty="0" smtClean="0"/>
+              <a:t>PLC</a:t>
+            </a:r>
+            <a:endParaRPr lang="en-US" dirty="0"/>
+          </a:p>
+        </p:txBody>
+      </p:sp>
+      <p:sp>
+        <p:nvSpPr>
+          <p:cNvPr id="20" name="CuadroTexto 19"/>
+          <p:cNvSpPr txBox="1"/>
+          <p:nvPr/>
+        </p:nvSpPr>
+        <p:spPr>
+          <a:xfrm>
+            <a:off x="9708776" y="3760330"/>
+            <a:ext cx="1378904" cy="646331"/>
+          </a:xfrm>
+          <a:prstGeom prst="rect">
+            <a:avLst/>
+          </a:prstGeom>
+          <a:noFill/>
+        </p:spPr>
+        <p:txBody>
+          <a:bodyPr wrap="none" rtlCol="0">
+            <a:spAutoFit/>
+          </a:bodyPr>
+          <a:lstStyle/>
+          <a:p>
+            <a:r>
+              <a:rPr lang="es-BO" dirty="0" smtClean="0"/>
+              <a:t>SWITCH O </a:t>
+            </a:r>
+          </a:p>
+          <a:p>
+            <a:r>
+              <a:rPr lang="es-BO" dirty="0" smtClean="0"/>
+              <a:t>GATEWAY</a:t>
+            </a:r>
+            <a:endParaRPr lang="en-US" dirty="0"/>
+          </a:p>
+        </p:txBody>
+      </p:sp>
+      <p:sp>
+        <p:nvSpPr>
+          <p:cNvPr id="21" name="CuadroTexto 20"/>
+          <p:cNvSpPr txBox="1"/>
+          <p:nvPr/>
+        </p:nvSpPr>
+        <p:spPr>
+          <a:xfrm>
+            <a:off x="9767828" y="4696786"/>
+            <a:ext cx="705642" cy="369332"/>
+          </a:xfrm>
+          <a:prstGeom prst="rect">
+            <a:avLst/>
+          </a:prstGeom>
+          <a:noFill/>
+        </p:spPr>
+        <p:txBody>
+          <a:bodyPr wrap="none" rtlCol="0">
+            <a:spAutoFit/>
+          </a:bodyPr>
+          <a:lstStyle/>
+          <a:p>
+            <a:r>
+              <a:rPr lang="es-BO" dirty="0" smtClean="0"/>
+              <a:t>HDM</a:t>
+            </a:r>
+            <a:endParaRPr lang="en-US" dirty="0"/>
+          </a:p>
+        </p:txBody>
+      </p:sp>
+      <p:sp>
+        <p:nvSpPr>
+          <p:cNvPr id="22" name="CuadroTexto 21"/>
+          <p:cNvSpPr txBox="1"/>
+          <p:nvPr/>
+        </p:nvSpPr>
+        <p:spPr>
+          <a:xfrm>
+            <a:off x="9594477" y="3428342"/>
+            <a:ext cx="1668470" cy="369332"/>
+          </a:xfrm>
+          <a:prstGeom prst="rect">
+            <a:avLst/>
+          </a:prstGeom>
+          <a:noFill/>
+        </p:spPr>
+        <p:txBody>
+          <a:bodyPr wrap="none" rtlCol="0">
+            <a:spAutoFit/>
+          </a:bodyPr>
+          <a:lstStyle/>
+          <a:p>
+            <a:r>
+              <a:rPr lang="es-BO" dirty="0" smtClean="0"/>
+              <a:t>ACTUADORES</a:t>
+            </a:r>
+            <a:endParaRPr lang="en-US" dirty="0"/>
+          </a:p>
+        </p:txBody>
+      </p:sp>
+      <p:sp>
+        <p:nvSpPr>
+          <p:cNvPr id="23" name="CuadroTexto 22"/>
+          <p:cNvSpPr txBox="1"/>
+          <p:nvPr/>
+        </p:nvSpPr>
+        <p:spPr>
+          <a:xfrm>
+            <a:off x="9711496" y="5601920"/>
+            <a:ext cx="1434432" cy="369332"/>
+          </a:xfrm>
+          <a:prstGeom prst="rect">
+            <a:avLst/>
+          </a:prstGeom>
+          <a:noFill/>
+        </p:spPr>
+        <p:txBody>
+          <a:bodyPr wrap="none" rtlCol="0">
+            <a:spAutoFit/>
+          </a:bodyPr>
+          <a:lstStyle/>
+          <a:p>
+            <a:r>
+              <a:rPr lang="es-BO" dirty="0" smtClean="0"/>
+              <a:t>SCADA/DCS</a:t>
+            </a:r>
+            <a:endParaRPr lang="en-US" dirty="0"/>
+          </a:p>
+        </p:txBody>
+      </p:sp>
+    </p:spTree>
+    <p:extLst>
+      <p:ext uri="{BB962C8B-B14F-4D97-AF65-F5344CB8AC3E}">
+        <p14:creationId xmlns:p14="http://schemas.microsoft.com/office/powerpoint/2010/main" val="2727957071"/>
+      </p:ext>
+    </p:extLst>
+  </p:cSld>
+  <p:clrMapOvr>
+    <a:masterClrMapping/>
+  </p:clrMapOvr>
+</p:sld>
+</file>
+
 <file path=ppt/slides/slide2.xml><?xml version="1.0" encoding="utf-8"?>
 <p:sld xmlns:a="http://schemas.openxmlformats.org/drawingml/2006/main" xmlns:r="http://schemas.openxmlformats.org/officeDocument/2006/relationships" xmlns:p="http://schemas.openxmlformats.org/presentationml/2006/main">
   <p:cSld>
@@ -8190,6 +9026,1061 @@
       </p:par>
     </p:tnLst>
   </p:timing>
+</p:sld>
+</file>
+
+<file path=ppt/slides/slide20.xml><?xml version="1.0" encoding="utf-8"?>
+<p:sld xmlns:a="http://schemas.openxmlformats.org/drawingml/2006/main" xmlns:r="http://schemas.openxmlformats.org/officeDocument/2006/relationships" xmlns:p="http://schemas.openxmlformats.org/presentationml/2006/main">
+  <p:cSld>
+    <p:spTree>
+      <p:nvGrpSpPr>
+        <p:cNvPr id="1" name=""/>
+        <p:cNvGrpSpPr/>
+        <p:nvPr/>
+      </p:nvGrpSpPr>
+      <p:grpSpPr>
+        <a:xfrm>
+          <a:off x="0" y="0"/>
+          <a:ext cx="0" cy="0"/>
+          <a:chOff x="0" y="0"/>
+          <a:chExt cx="0" cy="0"/>
+        </a:xfrm>
+      </p:grpSpPr>
+      <p:sp>
+        <p:nvSpPr>
+          <p:cNvPr id="2" name="Título 1"/>
+          <p:cNvSpPr>
+            <a:spLocks noGrp="1"/>
+          </p:cNvSpPr>
+          <p:nvPr>
+            <p:ph type="title"/>
+          </p:nvPr>
+        </p:nvSpPr>
+        <p:spPr/>
+        <p:txBody>
+          <a:bodyPr/>
+          <a:lstStyle/>
+          <a:p>
+            <a:r>
+              <a:rPr lang="es-BO" dirty="0" smtClean="0"/>
+              <a:t>PROTOCOLOS DE COMUNICACIÓN INDUSTRIALES</a:t>
+            </a:r>
+            <a:endParaRPr lang="en-US" dirty="0"/>
+          </a:p>
+        </p:txBody>
+      </p:sp>
+      <p:sp>
+        <p:nvSpPr>
+          <p:cNvPr id="3" name="Marcador de contenido 2"/>
+          <p:cNvSpPr>
+            <a:spLocks noGrp="1"/>
+          </p:cNvSpPr>
+          <p:nvPr>
+            <p:ph idx="1"/>
+          </p:nvPr>
+        </p:nvSpPr>
+        <p:spPr>
+          <a:xfrm>
+            <a:off x="1251678" y="2650896"/>
+            <a:ext cx="10178322" cy="3593591"/>
+          </a:xfrm>
+        </p:spPr>
+        <p:txBody>
+          <a:bodyPr/>
+          <a:lstStyle/>
+          <a:p>
+            <a:r>
+              <a:rPr lang="es-BO" dirty="0" smtClean="0"/>
+              <a:t>Son los lenguajes con el que las maquinas se comunicaran entre ellas, nos permitirán transmitir  información de muchísimos dispositivos.</a:t>
+            </a:r>
+            <a:endParaRPr lang="en-US" dirty="0"/>
+          </a:p>
+        </p:txBody>
+      </p:sp>
+      <p:pic>
+        <p:nvPicPr>
+          <p:cNvPr id="4" name="Imagen 3"/>
+          <p:cNvPicPr>
+            <a:picLocks noChangeAspect="1"/>
+          </p:cNvPicPr>
+          <p:nvPr/>
+        </p:nvPicPr>
+        <p:blipFill>
+          <a:blip r:embed="rId2"/>
+          <a:stretch>
+            <a:fillRect/>
+          </a:stretch>
+        </p:blipFill>
+        <p:spPr>
+          <a:xfrm>
+            <a:off x="1317663" y="3342638"/>
+            <a:ext cx="2133898" cy="1105054"/>
+          </a:xfrm>
+          <a:prstGeom prst="rect">
+            <a:avLst/>
+          </a:prstGeom>
+        </p:spPr>
+      </p:pic>
+      <p:pic>
+        <p:nvPicPr>
+          <p:cNvPr id="5" name="Imagen 4"/>
+          <p:cNvPicPr>
+            <a:picLocks noChangeAspect="1"/>
+          </p:cNvPicPr>
+          <p:nvPr/>
+        </p:nvPicPr>
+        <p:blipFill>
+          <a:blip r:embed="rId3"/>
+          <a:stretch>
+            <a:fillRect/>
+          </a:stretch>
+        </p:blipFill>
+        <p:spPr>
+          <a:xfrm>
+            <a:off x="4485553" y="3432868"/>
+            <a:ext cx="2324424" cy="781159"/>
+          </a:xfrm>
+          <a:prstGeom prst="rect">
+            <a:avLst/>
+          </a:prstGeom>
+        </p:spPr>
+      </p:pic>
+      <p:pic>
+        <p:nvPicPr>
+          <p:cNvPr id="6" name="Imagen 5"/>
+          <p:cNvPicPr>
+            <a:picLocks noChangeAspect="1"/>
+          </p:cNvPicPr>
+          <p:nvPr/>
+        </p:nvPicPr>
+        <p:blipFill>
+          <a:blip r:embed="rId4"/>
+          <a:stretch>
+            <a:fillRect/>
+          </a:stretch>
+        </p:blipFill>
+        <p:spPr>
+          <a:xfrm>
+            <a:off x="7933960" y="3350988"/>
+            <a:ext cx="2372056" cy="809738"/>
+          </a:xfrm>
+          <a:prstGeom prst="rect">
+            <a:avLst/>
+          </a:prstGeom>
+        </p:spPr>
+      </p:pic>
+      <p:pic>
+        <p:nvPicPr>
+          <p:cNvPr id="7" name="Imagen 6"/>
+          <p:cNvPicPr>
+            <a:picLocks noChangeAspect="1"/>
+          </p:cNvPicPr>
+          <p:nvPr/>
+        </p:nvPicPr>
+        <p:blipFill>
+          <a:blip r:embed="rId5"/>
+          <a:stretch>
+            <a:fillRect/>
+          </a:stretch>
+        </p:blipFill>
+        <p:spPr>
+          <a:xfrm>
+            <a:off x="1317663" y="5102961"/>
+            <a:ext cx="2257740" cy="962159"/>
+          </a:xfrm>
+          <a:prstGeom prst="rect">
+            <a:avLst/>
+          </a:prstGeom>
+        </p:spPr>
+      </p:pic>
+      <p:pic>
+        <p:nvPicPr>
+          <p:cNvPr id="8" name="Imagen 7"/>
+          <p:cNvPicPr>
+            <a:picLocks noChangeAspect="1"/>
+          </p:cNvPicPr>
+          <p:nvPr/>
+        </p:nvPicPr>
+        <p:blipFill>
+          <a:blip r:embed="rId6"/>
+          <a:stretch>
+            <a:fillRect/>
+          </a:stretch>
+        </p:blipFill>
+        <p:spPr>
+          <a:xfrm>
+            <a:off x="4623684" y="4990406"/>
+            <a:ext cx="2048161" cy="1038370"/>
+          </a:xfrm>
+          <a:prstGeom prst="rect">
+            <a:avLst/>
+          </a:prstGeom>
+        </p:spPr>
+      </p:pic>
+      <p:pic>
+        <p:nvPicPr>
+          <p:cNvPr id="9" name="Imagen 8"/>
+          <p:cNvPicPr>
+            <a:picLocks noChangeAspect="1"/>
+          </p:cNvPicPr>
+          <p:nvPr/>
+        </p:nvPicPr>
+        <p:blipFill>
+          <a:blip r:embed="rId7"/>
+          <a:stretch>
+            <a:fillRect/>
+          </a:stretch>
+        </p:blipFill>
+        <p:spPr>
+          <a:xfrm>
+            <a:off x="8154364" y="5102961"/>
+            <a:ext cx="2248214" cy="781159"/>
+          </a:xfrm>
+          <a:prstGeom prst="rect">
+            <a:avLst/>
+          </a:prstGeom>
+        </p:spPr>
+      </p:pic>
+    </p:spTree>
+    <p:extLst>
+      <p:ext uri="{BB962C8B-B14F-4D97-AF65-F5344CB8AC3E}">
+        <p14:creationId xmlns:p14="http://schemas.microsoft.com/office/powerpoint/2010/main" val="4251741033"/>
+      </p:ext>
+    </p:extLst>
+  </p:cSld>
+  <p:clrMapOvr>
+    <a:masterClrMapping/>
+  </p:clrMapOvr>
+</p:sld>
+</file>
+
+<file path=ppt/slides/slide21.xml><?xml version="1.0" encoding="utf-8"?>
+<p:sld xmlns:a="http://schemas.openxmlformats.org/drawingml/2006/main" xmlns:r="http://schemas.openxmlformats.org/officeDocument/2006/relationships" xmlns:p="http://schemas.openxmlformats.org/presentationml/2006/main">
+  <p:cSld>
+    <p:spTree>
+      <p:nvGrpSpPr>
+        <p:cNvPr id="1" name=""/>
+        <p:cNvGrpSpPr/>
+        <p:nvPr/>
+      </p:nvGrpSpPr>
+      <p:grpSpPr>
+        <a:xfrm>
+          <a:off x="0" y="0"/>
+          <a:ext cx="0" cy="0"/>
+          <a:chOff x="0" y="0"/>
+          <a:chExt cx="0" cy="0"/>
+        </a:xfrm>
+      </p:grpSpPr>
+      <p:sp>
+        <p:nvSpPr>
+          <p:cNvPr id="2" name="Título 1"/>
+          <p:cNvSpPr>
+            <a:spLocks noGrp="1"/>
+          </p:cNvSpPr>
+          <p:nvPr>
+            <p:ph type="title"/>
+          </p:nvPr>
+        </p:nvSpPr>
+        <p:spPr/>
+        <p:txBody>
+          <a:bodyPr/>
+          <a:lstStyle/>
+          <a:p>
+            <a:r>
+              <a:rPr lang="es-BO" dirty="0" smtClean="0"/>
+              <a:t>Revoluciones </a:t>
+            </a:r>
+            <a:r>
+              <a:rPr lang="es-BO" dirty="0" err="1" smtClean="0"/>
+              <a:t>industruales</a:t>
+            </a:r>
+            <a:endParaRPr lang="en-US" dirty="0"/>
+          </a:p>
+        </p:txBody>
+      </p:sp>
+      <p:sp>
+        <p:nvSpPr>
+          <p:cNvPr id="3" name="Marcador de contenido 2"/>
+          <p:cNvSpPr>
+            <a:spLocks noGrp="1"/>
+          </p:cNvSpPr>
+          <p:nvPr>
+            <p:ph idx="1"/>
+          </p:nvPr>
+        </p:nvSpPr>
+        <p:spPr/>
+        <p:txBody>
+          <a:bodyPr/>
+          <a:lstStyle/>
+          <a:p>
+            <a:r>
+              <a:rPr lang="es-BO" dirty="0" smtClean="0"/>
+              <a:t>Primera revolución industrial 1760 – 1840 sistemas a vapor, eliminando trabajos manuales.</a:t>
+            </a:r>
+          </a:p>
+          <a:p>
+            <a:r>
+              <a:rPr lang="es-BO" dirty="0" smtClean="0"/>
+              <a:t>Segunda revolución industrial 1870 – 1914 sistemas eléctricos.</a:t>
+            </a:r>
+          </a:p>
+          <a:p>
+            <a:r>
+              <a:rPr lang="es-BO" dirty="0" smtClean="0"/>
+              <a:t>Tercera revolución industrial años 60, dispositivos mas compactos con los PLC, la </a:t>
+            </a:r>
+            <a:r>
+              <a:rPr lang="es-BO" dirty="0" err="1" smtClean="0"/>
+              <a:t>electronica</a:t>
+            </a:r>
+            <a:endParaRPr lang="es-BO" dirty="0"/>
+          </a:p>
+          <a:p>
+            <a:r>
+              <a:rPr lang="es-BO" dirty="0" smtClean="0"/>
+              <a:t>Cuarta revolución industrial – utilización de </a:t>
+            </a:r>
+            <a:r>
+              <a:rPr lang="es-BO" dirty="0" err="1" smtClean="0"/>
+              <a:t>robotica</a:t>
+            </a:r>
+            <a:r>
+              <a:rPr lang="es-BO" dirty="0" smtClean="0"/>
+              <a:t>, IA </a:t>
+            </a:r>
+            <a:endParaRPr lang="en-US" dirty="0"/>
+          </a:p>
+        </p:txBody>
+      </p:sp>
+    </p:spTree>
+    <p:extLst>
+      <p:ext uri="{BB962C8B-B14F-4D97-AF65-F5344CB8AC3E}">
+        <p14:creationId xmlns:p14="http://schemas.microsoft.com/office/powerpoint/2010/main" val="1212100707"/>
+      </p:ext>
+    </p:extLst>
+  </p:cSld>
+  <p:clrMapOvr>
+    <a:masterClrMapping/>
+  </p:clrMapOvr>
+</p:sld>
+</file>
+
+<file path=ppt/slides/slide22.xml><?xml version="1.0" encoding="utf-8"?>
+<p:sld xmlns:a="http://schemas.openxmlformats.org/drawingml/2006/main" xmlns:r="http://schemas.openxmlformats.org/officeDocument/2006/relationships" xmlns:p="http://schemas.openxmlformats.org/presentationml/2006/main">
+  <p:cSld>
+    <p:spTree>
+      <p:nvGrpSpPr>
+        <p:cNvPr id="1" name=""/>
+        <p:cNvGrpSpPr/>
+        <p:nvPr/>
+      </p:nvGrpSpPr>
+      <p:grpSpPr>
+        <a:xfrm>
+          <a:off x="0" y="0"/>
+          <a:ext cx="0" cy="0"/>
+          <a:chOff x="0" y="0"/>
+          <a:chExt cx="0" cy="0"/>
+        </a:xfrm>
+      </p:grpSpPr>
+      <p:sp>
+        <p:nvSpPr>
+          <p:cNvPr id="5" name="Título 4"/>
+          <p:cNvSpPr>
+            <a:spLocks noGrp="1"/>
+          </p:cNvSpPr>
+          <p:nvPr>
+            <p:ph type="title"/>
+          </p:nvPr>
+        </p:nvSpPr>
+        <p:spPr/>
+        <p:txBody>
+          <a:bodyPr/>
+          <a:lstStyle/>
+          <a:p>
+            <a:r>
+              <a:rPr lang="es-BO" dirty="0" smtClean="0"/>
+              <a:t>Una mescla de lo convencional con lo actual</a:t>
+            </a:r>
+            <a:endParaRPr lang="en-US" dirty="0"/>
+          </a:p>
+        </p:txBody>
+      </p:sp>
+      <p:sp>
+        <p:nvSpPr>
+          <p:cNvPr id="6" name="Marcador de contenido 5"/>
+          <p:cNvSpPr>
+            <a:spLocks noGrp="1"/>
+          </p:cNvSpPr>
+          <p:nvPr>
+            <p:ph sz="half" idx="1"/>
+          </p:nvPr>
+        </p:nvSpPr>
+        <p:spPr/>
+        <p:txBody>
+          <a:bodyPr>
+            <a:normAutofit/>
+          </a:bodyPr>
+          <a:lstStyle/>
+          <a:p>
+            <a:r>
+              <a:rPr lang="es-BO" sz="1200" dirty="0" smtClean="0"/>
+              <a:t>Dispositivos EDGE – Como computadoras </a:t>
+            </a:r>
+            <a:r>
+              <a:rPr lang="es-BO" sz="1200" dirty="0" err="1" smtClean="0"/>
+              <a:t>indusctriales</a:t>
+            </a:r>
+            <a:r>
+              <a:rPr lang="es-BO" sz="1200" dirty="0" smtClean="0"/>
+              <a:t>, cargan un sistema operativo y permiten cargar lenguajes de programación moderno</a:t>
+            </a:r>
+          </a:p>
+          <a:p>
+            <a:r>
+              <a:rPr lang="es-BO" sz="1200" dirty="0" err="1" smtClean="0"/>
+              <a:t>PLCs</a:t>
+            </a:r>
+            <a:r>
+              <a:rPr lang="es-BO" sz="1200" dirty="0" smtClean="0"/>
+              <a:t> open </a:t>
+            </a:r>
+            <a:r>
+              <a:rPr lang="es-BO" sz="1200" dirty="0" err="1" smtClean="0"/>
+              <a:t>source</a:t>
+            </a:r>
+            <a:r>
+              <a:rPr lang="es-BO" sz="1200" dirty="0" smtClean="0"/>
+              <a:t> – acceso para instalar aplicaciones un hibrido entre un PLC y una computadora.</a:t>
+            </a:r>
+          </a:p>
+          <a:p>
+            <a:r>
+              <a:rPr lang="es-BO" sz="1200" dirty="0" smtClean="0"/>
+              <a:t>GATEWAYS </a:t>
+            </a:r>
+            <a:r>
+              <a:rPr lang="es-BO" sz="1200" dirty="0" err="1" smtClean="0"/>
+              <a:t>IoT</a:t>
+            </a:r>
+            <a:r>
+              <a:rPr lang="es-BO" sz="1200" dirty="0" smtClean="0"/>
+              <a:t> – protocolos convencionales a mejores</a:t>
+            </a:r>
+          </a:p>
+          <a:p>
+            <a:r>
+              <a:rPr lang="es-BO" sz="1200" dirty="0" smtClean="0"/>
+              <a:t>Firewalls Industriales – Bloquear trafico </a:t>
+            </a:r>
+            <a:r>
+              <a:rPr lang="es-BO" sz="1200" dirty="0" err="1" smtClean="0"/>
+              <a:t>indeceado</a:t>
+            </a:r>
+            <a:endParaRPr lang="es-BO" sz="1200" dirty="0" smtClean="0"/>
+          </a:p>
+          <a:p>
+            <a:r>
+              <a:rPr lang="es-BO" sz="1200" dirty="0" smtClean="0"/>
+              <a:t>Protocolos </a:t>
+            </a:r>
+            <a:r>
+              <a:rPr lang="es-BO" sz="1200" dirty="0" err="1" smtClean="0"/>
+              <a:t>IoT</a:t>
+            </a:r>
+            <a:r>
+              <a:rPr lang="es-BO" sz="1200" dirty="0" smtClean="0"/>
+              <a:t> – </a:t>
+            </a:r>
+          </a:p>
+          <a:p>
+            <a:r>
+              <a:rPr lang="es-BO" sz="1200" dirty="0" smtClean="0"/>
+              <a:t>Software especializado – ayuda a crear aplicaciones </a:t>
+            </a:r>
+          </a:p>
+          <a:p>
+            <a:r>
+              <a:rPr lang="es-BO" sz="1200" dirty="0" smtClean="0"/>
+              <a:t>Lenguajes de programación – ayuda con programación </a:t>
+            </a:r>
+            <a:endParaRPr lang="en-US" sz="1200" dirty="0"/>
+          </a:p>
+        </p:txBody>
+      </p:sp>
+      <p:pic>
+        <p:nvPicPr>
+          <p:cNvPr id="8" name="Marcador de contenido 7"/>
+          <p:cNvPicPr>
+            <a:picLocks noGrp="1" noChangeAspect="1"/>
+          </p:cNvPicPr>
+          <p:nvPr>
+            <p:ph sz="half" idx="2"/>
+          </p:nvPr>
+        </p:nvPicPr>
+        <p:blipFill>
+          <a:blip r:embed="rId2"/>
+          <a:stretch>
+            <a:fillRect/>
+          </a:stretch>
+        </p:blipFill>
+        <p:spPr>
+          <a:xfrm>
+            <a:off x="6143615" y="2528716"/>
+            <a:ext cx="5734621" cy="2822876"/>
+          </a:xfrm>
+          <a:prstGeom prst="rect">
+            <a:avLst/>
+          </a:prstGeom>
+        </p:spPr>
+      </p:pic>
+    </p:spTree>
+    <p:extLst>
+      <p:ext uri="{BB962C8B-B14F-4D97-AF65-F5344CB8AC3E}">
+        <p14:creationId xmlns:p14="http://schemas.microsoft.com/office/powerpoint/2010/main" val="3618116233"/>
+      </p:ext>
+    </p:extLst>
+  </p:cSld>
+  <p:clrMapOvr>
+    <a:masterClrMapping/>
+  </p:clrMapOvr>
+</p:sld>
+</file>
+
+<file path=ppt/slides/slide23.xml><?xml version="1.0" encoding="utf-8"?>
+<p:sld xmlns:a="http://schemas.openxmlformats.org/drawingml/2006/main" xmlns:r="http://schemas.openxmlformats.org/officeDocument/2006/relationships" xmlns:p="http://schemas.openxmlformats.org/presentationml/2006/main">
+  <p:cSld>
+    <p:spTree>
+      <p:nvGrpSpPr>
+        <p:cNvPr id="1" name=""/>
+        <p:cNvGrpSpPr/>
+        <p:nvPr/>
+      </p:nvGrpSpPr>
+      <p:grpSpPr>
+        <a:xfrm>
+          <a:off x="0" y="0"/>
+          <a:ext cx="0" cy="0"/>
+          <a:chOff x="0" y="0"/>
+          <a:chExt cx="0" cy="0"/>
+        </a:xfrm>
+      </p:grpSpPr>
+      <p:sp>
+        <p:nvSpPr>
+          <p:cNvPr id="2" name="Título 1"/>
+          <p:cNvSpPr>
+            <a:spLocks noGrp="1"/>
+          </p:cNvSpPr>
+          <p:nvPr>
+            <p:ph type="title"/>
+          </p:nvPr>
+        </p:nvSpPr>
+        <p:spPr/>
+        <p:txBody>
+          <a:bodyPr/>
+          <a:lstStyle/>
+          <a:p>
+            <a:r>
+              <a:rPr lang="es-BO" dirty="0" smtClean="0"/>
+              <a:t>PROTOCOLOR DE COMUNICACIÓN – MODBUS Y MQTT</a:t>
+            </a:r>
+            <a:endParaRPr lang="en-US" dirty="0"/>
+          </a:p>
+        </p:txBody>
+      </p:sp>
+      <p:pic>
+        <p:nvPicPr>
+          <p:cNvPr id="5" name="Imagen 4"/>
+          <p:cNvPicPr>
+            <a:picLocks noChangeAspect="1"/>
+          </p:cNvPicPr>
+          <p:nvPr/>
+        </p:nvPicPr>
+        <p:blipFill>
+          <a:blip r:embed="rId2"/>
+          <a:stretch>
+            <a:fillRect/>
+          </a:stretch>
+        </p:blipFill>
+        <p:spPr>
+          <a:xfrm>
+            <a:off x="1123817" y="2026824"/>
+            <a:ext cx="9926435" cy="581106"/>
+          </a:xfrm>
+          <a:prstGeom prst="rect">
+            <a:avLst/>
+          </a:prstGeom>
+        </p:spPr>
+      </p:pic>
+      <p:pic>
+        <p:nvPicPr>
+          <p:cNvPr id="6" name="Imagen 5"/>
+          <p:cNvPicPr>
+            <a:picLocks noChangeAspect="1"/>
+          </p:cNvPicPr>
+          <p:nvPr/>
+        </p:nvPicPr>
+        <p:blipFill>
+          <a:blip r:embed="rId3"/>
+          <a:stretch>
+            <a:fillRect/>
+          </a:stretch>
+        </p:blipFill>
+        <p:spPr>
+          <a:xfrm>
+            <a:off x="3194824" y="2760237"/>
+            <a:ext cx="5784419" cy="4074095"/>
+          </a:xfrm>
+          <a:prstGeom prst="rect">
+            <a:avLst/>
+          </a:prstGeom>
+        </p:spPr>
+      </p:pic>
+    </p:spTree>
+    <p:extLst>
+      <p:ext uri="{BB962C8B-B14F-4D97-AF65-F5344CB8AC3E}">
+        <p14:creationId xmlns:p14="http://schemas.microsoft.com/office/powerpoint/2010/main" val="4189549020"/>
+      </p:ext>
+    </p:extLst>
+  </p:cSld>
+  <p:clrMapOvr>
+    <a:masterClrMapping/>
+  </p:clrMapOvr>
+</p:sld>
+</file>
+
+<file path=ppt/slides/slide24.xml><?xml version="1.0" encoding="utf-8"?>
+<p:sld xmlns:a="http://schemas.openxmlformats.org/drawingml/2006/main" xmlns:r="http://schemas.openxmlformats.org/officeDocument/2006/relationships" xmlns:p="http://schemas.openxmlformats.org/presentationml/2006/main">
+  <p:cSld>
+    <p:spTree>
+      <p:nvGrpSpPr>
+        <p:cNvPr id="1" name=""/>
+        <p:cNvGrpSpPr/>
+        <p:nvPr/>
+      </p:nvGrpSpPr>
+      <p:grpSpPr>
+        <a:xfrm>
+          <a:off x="0" y="0"/>
+          <a:ext cx="0" cy="0"/>
+          <a:chOff x="0" y="0"/>
+          <a:chExt cx="0" cy="0"/>
+        </a:xfrm>
+      </p:grpSpPr>
+      <p:sp>
+        <p:nvSpPr>
+          <p:cNvPr id="5" name="Título 4"/>
+          <p:cNvSpPr>
+            <a:spLocks noGrp="1"/>
+          </p:cNvSpPr>
+          <p:nvPr>
+            <p:ph type="title"/>
+          </p:nvPr>
+        </p:nvSpPr>
+        <p:spPr/>
+        <p:txBody>
+          <a:bodyPr/>
+          <a:lstStyle/>
+          <a:p>
+            <a:r>
+              <a:rPr lang="es-BO" dirty="0" smtClean="0"/>
+              <a:t>¿Que es un protocolo de comunicación?</a:t>
+            </a:r>
+            <a:endParaRPr lang="en-US" dirty="0"/>
+          </a:p>
+        </p:txBody>
+      </p:sp>
+      <p:sp>
+        <p:nvSpPr>
+          <p:cNvPr id="6" name="Marcador de contenido 5"/>
+          <p:cNvSpPr>
+            <a:spLocks noGrp="1"/>
+          </p:cNvSpPr>
+          <p:nvPr>
+            <p:ph idx="1"/>
+          </p:nvPr>
+        </p:nvSpPr>
+        <p:spPr>
+          <a:xfrm>
+            <a:off x="1251678" y="1792942"/>
+            <a:ext cx="10178322" cy="3593591"/>
+          </a:xfrm>
+        </p:spPr>
+        <p:txBody>
+          <a:bodyPr>
+            <a:normAutofit/>
+          </a:bodyPr>
+          <a:lstStyle/>
+          <a:p>
+            <a:r>
+              <a:rPr lang="es-BO" sz="1400" dirty="0" smtClean="0"/>
+              <a:t>Un protocolo de comunicación es un conjunto de reglas que utilizan dos o mas dispositivos para enviarse información entre si.</a:t>
+            </a:r>
+          </a:p>
+          <a:p>
+            <a:r>
+              <a:rPr lang="es-BO" sz="1400" dirty="0" smtClean="0"/>
+              <a:t>Es un lista de instrucciones que define:</a:t>
+            </a:r>
+          </a:p>
+          <a:p>
+            <a:pPr algn="ctr"/>
+            <a:r>
+              <a:rPr lang="es-BO" sz="1400" dirty="0" smtClean="0"/>
+              <a:t>Como comenzar la con conversación</a:t>
+            </a:r>
+          </a:p>
+          <a:p>
+            <a:pPr algn="ctr"/>
+            <a:r>
+              <a:rPr lang="es-BO" sz="1400" dirty="0" smtClean="0"/>
+              <a:t>Como turnarse para hablar </a:t>
+            </a:r>
+          </a:p>
+          <a:p>
+            <a:pPr algn="ctr"/>
+            <a:r>
+              <a:rPr lang="es-BO" sz="1400" dirty="0" smtClean="0"/>
+              <a:t>En que “idioma” hablar</a:t>
+            </a:r>
+          </a:p>
+          <a:p>
+            <a:pPr algn="ctr"/>
+            <a:r>
+              <a:rPr lang="es-BO" sz="1400" dirty="0" smtClean="0"/>
+              <a:t>Como saber que la comunicación ha terminado</a:t>
+            </a:r>
+          </a:p>
+          <a:p>
+            <a:pPr algn="just"/>
+            <a:r>
+              <a:rPr lang="es-BO" sz="1400" dirty="0" smtClean="0"/>
+              <a:t>Actualmente existen cientos de protocolos de comunicación y cada uno tiene sus fortalezas y debilidades.</a:t>
+            </a:r>
+          </a:p>
+          <a:p>
+            <a:pPr algn="just"/>
+            <a:r>
+              <a:rPr lang="es-BO" sz="1400" dirty="0" smtClean="0"/>
+              <a:t>Protocolos que se vera en la clase: MQTT y </a:t>
+            </a:r>
+            <a:r>
+              <a:rPr lang="es-BO" sz="1400" dirty="0" err="1" smtClean="0"/>
+              <a:t>Modbus</a:t>
+            </a:r>
+            <a:endParaRPr lang="es-BO" sz="1400" dirty="0" smtClean="0"/>
+          </a:p>
+          <a:p>
+            <a:pPr algn="just"/>
+            <a:endParaRPr lang="en-US" sz="1400" dirty="0"/>
+          </a:p>
+        </p:txBody>
+      </p:sp>
+      <p:pic>
+        <p:nvPicPr>
+          <p:cNvPr id="7" name="Imagen 6"/>
+          <p:cNvPicPr>
+            <a:picLocks noChangeAspect="1"/>
+          </p:cNvPicPr>
+          <p:nvPr/>
+        </p:nvPicPr>
+        <p:blipFill>
+          <a:blip r:embed="rId2"/>
+          <a:stretch>
+            <a:fillRect/>
+          </a:stretch>
+        </p:blipFill>
+        <p:spPr>
+          <a:xfrm>
+            <a:off x="1666306" y="4367026"/>
+            <a:ext cx="3685624" cy="2490974"/>
+          </a:xfrm>
+          <a:prstGeom prst="rect">
+            <a:avLst/>
+          </a:prstGeom>
+        </p:spPr>
+      </p:pic>
+      <p:pic>
+        <p:nvPicPr>
+          <p:cNvPr id="8" name="Imagen 7"/>
+          <p:cNvPicPr>
+            <a:picLocks noChangeAspect="1"/>
+          </p:cNvPicPr>
+          <p:nvPr/>
+        </p:nvPicPr>
+        <p:blipFill>
+          <a:blip r:embed="rId3"/>
+          <a:stretch>
+            <a:fillRect/>
+          </a:stretch>
+        </p:blipFill>
+        <p:spPr>
+          <a:xfrm>
+            <a:off x="6203548" y="4155728"/>
+            <a:ext cx="3727304" cy="1352456"/>
+          </a:xfrm>
+          <a:prstGeom prst="rect">
+            <a:avLst/>
+          </a:prstGeom>
+        </p:spPr>
+      </p:pic>
+      <p:pic>
+        <p:nvPicPr>
+          <p:cNvPr id="9" name="Imagen 8"/>
+          <p:cNvPicPr>
+            <a:picLocks noChangeAspect="1"/>
+          </p:cNvPicPr>
+          <p:nvPr/>
+        </p:nvPicPr>
+        <p:blipFill>
+          <a:blip r:embed="rId4"/>
+          <a:stretch>
+            <a:fillRect/>
+          </a:stretch>
+        </p:blipFill>
+        <p:spPr>
+          <a:xfrm>
+            <a:off x="6203548" y="5484002"/>
+            <a:ext cx="2800741" cy="1276528"/>
+          </a:xfrm>
+          <a:prstGeom prst="rect">
+            <a:avLst/>
+          </a:prstGeom>
+        </p:spPr>
+      </p:pic>
+    </p:spTree>
+    <p:extLst>
+      <p:ext uri="{BB962C8B-B14F-4D97-AF65-F5344CB8AC3E}">
+        <p14:creationId xmlns:p14="http://schemas.microsoft.com/office/powerpoint/2010/main" val="4028782410"/>
+      </p:ext>
+    </p:extLst>
+  </p:cSld>
+  <p:clrMapOvr>
+    <a:masterClrMapping/>
+  </p:clrMapOvr>
+</p:sld>
+</file>
+
+<file path=ppt/slides/slide25.xml><?xml version="1.0" encoding="utf-8"?>
+<p:sld xmlns:a="http://schemas.openxmlformats.org/drawingml/2006/main" xmlns:r="http://schemas.openxmlformats.org/officeDocument/2006/relationships" xmlns:p="http://schemas.openxmlformats.org/presentationml/2006/main">
+  <p:cSld>
+    <p:spTree>
+      <p:nvGrpSpPr>
+        <p:cNvPr id="1" name=""/>
+        <p:cNvGrpSpPr/>
+        <p:nvPr/>
+      </p:nvGrpSpPr>
+      <p:grpSpPr>
+        <a:xfrm>
+          <a:off x="0" y="0"/>
+          <a:ext cx="0" cy="0"/>
+          <a:chOff x="0" y="0"/>
+          <a:chExt cx="0" cy="0"/>
+        </a:xfrm>
+      </p:grpSpPr>
+      <p:sp>
+        <p:nvSpPr>
+          <p:cNvPr id="10" name="Título 9"/>
+          <p:cNvSpPr>
+            <a:spLocks noGrp="1"/>
+          </p:cNvSpPr>
+          <p:nvPr>
+            <p:ph type="title"/>
+          </p:nvPr>
+        </p:nvSpPr>
+        <p:spPr/>
+        <p:txBody>
+          <a:bodyPr/>
+          <a:lstStyle/>
+          <a:p>
+            <a:r>
+              <a:rPr lang="es-BO" dirty="0" smtClean="0"/>
+              <a:t>CONECTIVIDAD INDUSTRIAL</a:t>
+            </a:r>
+            <a:endParaRPr lang="en-US" dirty="0"/>
+          </a:p>
+        </p:txBody>
+      </p:sp>
+      <p:sp>
+        <p:nvSpPr>
+          <p:cNvPr id="11" name="Marcador de contenido 10"/>
+          <p:cNvSpPr>
+            <a:spLocks noGrp="1"/>
+          </p:cNvSpPr>
+          <p:nvPr>
+            <p:ph idx="1"/>
+          </p:nvPr>
+        </p:nvSpPr>
+        <p:spPr/>
+        <p:txBody>
+          <a:bodyPr/>
+          <a:lstStyle/>
+          <a:p>
+            <a:r>
+              <a:rPr lang="es-BO" dirty="0" smtClean="0"/>
+              <a:t>La transformación digital ha revolucionado la fabricación y la automatización industrial</a:t>
+            </a:r>
+            <a:r>
+              <a:rPr lang="en-US" dirty="0" smtClean="0"/>
+              <a:t>.</a:t>
+            </a:r>
+          </a:p>
+          <a:p>
+            <a:r>
+              <a:rPr lang="es-BO" dirty="0" smtClean="0"/>
+              <a:t>Con ello, los protocolos de comunicación se han convertido en una parte fundamental de los procesos al permitir la conexión y el intercambio de datos entre dispositivos y sistemas en entornos industriales.</a:t>
+            </a:r>
+          </a:p>
+        </p:txBody>
+      </p:sp>
+    </p:spTree>
+    <p:extLst>
+      <p:ext uri="{BB962C8B-B14F-4D97-AF65-F5344CB8AC3E}">
+        <p14:creationId xmlns:p14="http://schemas.microsoft.com/office/powerpoint/2010/main" val="1748495303"/>
+      </p:ext>
+    </p:extLst>
+  </p:cSld>
+  <p:clrMapOvr>
+    <a:masterClrMapping/>
+  </p:clrMapOvr>
+</p:sld>
+</file>
+
+<file path=ppt/slides/slide26.xml><?xml version="1.0" encoding="utf-8"?>
+<p:sld xmlns:a="http://schemas.openxmlformats.org/drawingml/2006/main" xmlns:r="http://schemas.openxmlformats.org/officeDocument/2006/relationships" xmlns:p="http://schemas.openxmlformats.org/presentationml/2006/main">
+  <p:cSld>
+    <p:spTree>
+      <p:nvGrpSpPr>
+        <p:cNvPr id="1" name=""/>
+        <p:cNvGrpSpPr/>
+        <p:nvPr/>
+      </p:nvGrpSpPr>
+      <p:grpSpPr>
+        <a:xfrm>
+          <a:off x="0" y="0"/>
+          <a:ext cx="0" cy="0"/>
+          <a:chOff x="0" y="0"/>
+          <a:chExt cx="0" cy="0"/>
+        </a:xfrm>
+      </p:grpSpPr>
+      <p:sp>
+        <p:nvSpPr>
+          <p:cNvPr id="2" name="Título 1"/>
+          <p:cNvSpPr>
+            <a:spLocks noGrp="1"/>
+          </p:cNvSpPr>
+          <p:nvPr>
+            <p:ph type="title"/>
+          </p:nvPr>
+        </p:nvSpPr>
+        <p:spPr/>
+        <p:txBody>
+          <a:bodyPr/>
+          <a:lstStyle/>
+          <a:p>
+            <a:r>
+              <a:rPr lang="es-BO" dirty="0" err="1" smtClean="0"/>
+              <a:t>modbus</a:t>
+            </a:r>
+            <a:endParaRPr lang="en-US" dirty="0"/>
+          </a:p>
+        </p:txBody>
+      </p:sp>
+      <p:sp>
+        <p:nvSpPr>
+          <p:cNvPr id="3" name="Marcador de contenido 2"/>
+          <p:cNvSpPr>
+            <a:spLocks noGrp="1"/>
+          </p:cNvSpPr>
+          <p:nvPr>
+            <p:ph idx="1"/>
+          </p:nvPr>
+        </p:nvSpPr>
+        <p:spPr>
+          <a:xfrm>
+            <a:off x="1251678" y="1488141"/>
+            <a:ext cx="10178322" cy="5074024"/>
+          </a:xfrm>
+        </p:spPr>
+        <p:txBody>
+          <a:bodyPr>
+            <a:normAutofit/>
+          </a:bodyPr>
+          <a:lstStyle/>
+          <a:p>
+            <a:r>
+              <a:rPr lang="es-BO" sz="1400" dirty="0" smtClean="0"/>
+              <a:t>La comunicación MODBUS siempre se hace de formal local. Esto significa que no podrán comunicar desde google </a:t>
+            </a:r>
+            <a:r>
+              <a:rPr lang="es-BO" sz="1400" dirty="0" err="1" smtClean="0"/>
+              <a:t>colab</a:t>
+            </a:r>
+            <a:r>
+              <a:rPr lang="es-BO" sz="1400" dirty="0" smtClean="0"/>
+              <a:t>.</a:t>
+            </a:r>
+          </a:p>
+          <a:p>
+            <a:endParaRPr lang="en-US" sz="1400" dirty="0"/>
+          </a:p>
+        </p:txBody>
+      </p:sp>
+      <p:pic>
+        <p:nvPicPr>
+          <p:cNvPr id="4" name="Imagen 3"/>
+          <p:cNvPicPr>
+            <a:picLocks noChangeAspect="1"/>
+          </p:cNvPicPr>
+          <p:nvPr/>
+        </p:nvPicPr>
+        <p:blipFill>
+          <a:blip r:embed="rId2"/>
+          <a:stretch>
+            <a:fillRect/>
+          </a:stretch>
+        </p:blipFill>
+        <p:spPr>
+          <a:xfrm>
+            <a:off x="1251678" y="2530204"/>
+            <a:ext cx="4829849" cy="2191056"/>
+          </a:xfrm>
+          <a:prstGeom prst="rect">
+            <a:avLst/>
+          </a:prstGeom>
+        </p:spPr>
+      </p:pic>
+      <p:pic>
+        <p:nvPicPr>
+          <p:cNvPr id="5" name="Imagen 4"/>
+          <p:cNvPicPr>
+            <a:picLocks noChangeAspect="1"/>
+          </p:cNvPicPr>
+          <p:nvPr/>
+        </p:nvPicPr>
+        <p:blipFill>
+          <a:blip r:embed="rId3"/>
+          <a:stretch>
+            <a:fillRect/>
+          </a:stretch>
+        </p:blipFill>
+        <p:spPr>
+          <a:xfrm>
+            <a:off x="6846318" y="2519976"/>
+            <a:ext cx="3142522" cy="2201284"/>
+          </a:xfrm>
+          <a:prstGeom prst="rect">
+            <a:avLst/>
+          </a:prstGeom>
+        </p:spPr>
+      </p:pic>
+    </p:spTree>
+    <p:extLst>
+      <p:ext uri="{BB962C8B-B14F-4D97-AF65-F5344CB8AC3E}">
+        <p14:creationId xmlns:p14="http://schemas.microsoft.com/office/powerpoint/2010/main" val="774638078"/>
+      </p:ext>
+    </p:extLst>
+  </p:cSld>
+  <p:clrMapOvr>
+    <a:masterClrMapping/>
+  </p:clrMapOvr>
 </p:sld>
 </file>
 

</xml_diff>